<commit_message>
add few slides on attention
</commit_message>
<xml_diff>
--- a/mylearnings/mylecturenotes/AttentionAndTransformers.pptx
+++ b/mylearnings/mylecturenotes/AttentionAndTransformers.pptx
@@ -5,7 +5,7 @@
     <p:sldMasterId id="2147483648" r:id="rId1"/>
   </p:sldMasterIdLst>
   <p:notesMasterIdLst>
-    <p:notesMasterId r:id="rId18"/>
+    <p:notesMasterId r:id="rId24"/>
   </p:notesMasterIdLst>
   <p:sldIdLst>
     <p:sldId id="256" r:id="rId2"/>
@@ -23,7 +23,13 @@
     <p:sldId id="267" r:id="rId14"/>
     <p:sldId id="271" r:id="rId15"/>
     <p:sldId id="270" r:id="rId16"/>
-    <p:sldId id="257" r:id="rId17"/>
+    <p:sldId id="275" r:id="rId17"/>
+    <p:sldId id="276" r:id="rId18"/>
+    <p:sldId id="274" r:id="rId19"/>
+    <p:sldId id="272" r:id="rId20"/>
+    <p:sldId id="273" r:id="rId21"/>
+    <p:sldId id="277" r:id="rId22"/>
+    <p:sldId id="257" r:id="rId23"/>
   </p:sldIdLst>
   <p:sldSz cx="12192000" cy="6858000"/>
   <p:notesSz cx="6858000" cy="9144000"/>
@@ -142,6 +148,12 @@
             <p14:sldId id="267"/>
             <p14:sldId id="271"/>
             <p14:sldId id="270"/>
+            <p14:sldId id="275"/>
+            <p14:sldId id="276"/>
+            <p14:sldId id="274"/>
+            <p14:sldId id="272"/>
+            <p14:sldId id="273"/>
+            <p14:sldId id="277"/>
             <p14:sldId id="257"/>
           </p14:sldIdLst>
         </p14:section>
@@ -5059,7 +5071,7 @@
           <p:cNvPr id="2" name="Title 1">
             <a:extLst>
               <a:ext uri="{FF2B5EF4-FFF2-40B4-BE49-F238E27FC236}">
-                <a16:creationId xmlns:a16="http://schemas.microsoft.com/office/drawing/2014/main" id="{CCE09888-7415-94D9-50B0-0B54B777E756}"/>
+                <a16:creationId xmlns:a16="http://schemas.microsoft.com/office/drawing/2014/main" id="{33E0864B-64B9-356F-573B-5C91B6427D1A}"/>
               </a:ext>
             </a:extLst>
           </p:cNvPr>
@@ -5072,8 +5084,8 @@
         </p:nvSpPr>
         <p:spPr>
           <a:xfrm>
-            <a:off x="271669" y="136525"/>
-            <a:ext cx="10515600" cy="544512"/>
+            <a:off x="146222" y="136525"/>
+            <a:ext cx="10515600" cy="611059"/>
           </a:xfrm>
         </p:spPr>
         <p:txBody>
@@ -5084,7 +5096,7 @@
           <a:p>
             <a:r>
               <a:rPr lang="en-US" dirty="0"/>
-              <a:t>References </a:t>
+              <a:t>Vision Transformers </a:t>
             </a:r>
           </a:p>
         </p:txBody>
@@ -5094,7 +5106,7 @@
           <p:cNvPr id="3" name="Content Placeholder 2">
             <a:extLst>
               <a:ext uri="{FF2B5EF4-FFF2-40B4-BE49-F238E27FC236}">
-                <a16:creationId xmlns:a16="http://schemas.microsoft.com/office/drawing/2014/main" id="{9B83B793-1BE9-C9A9-21AC-9BEBCB818BBE}"/>
+                <a16:creationId xmlns:a16="http://schemas.microsoft.com/office/drawing/2014/main" id="{A5FC1409-0505-BCFC-456C-EF4B9BA34181}"/>
               </a:ext>
             </a:extLst>
           </p:cNvPr>
@@ -5105,212 +5117,12 @@
             <p:ph idx="1"/>
           </p:nvPr>
         </p:nvSpPr>
-        <p:spPr>
-          <a:xfrm>
-            <a:off x="838200" y="805070"/>
-            <a:ext cx="10515600" cy="5371893"/>
-          </a:xfrm>
-        </p:spPr>
-        <p:txBody>
-          <a:bodyPr>
-            <a:normAutofit/>
-          </a:bodyPr>
-          <a:lstStyle/>
-          <a:p>
-            <a:r>
-              <a:rPr lang="en-US" dirty="0"/>
-              <a:t>Blog posts </a:t>
-            </a:r>
-          </a:p>
-          <a:p>
-            <a:pPr lvl="1"/>
-            <a:r>
-              <a:rPr lang="en-US" sz="1200" dirty="0">
-                <a:hlinkClick r:id="rId2"/>
-              </a:rPr>
-              <a:t>The </a:t>
-            </a:r>
-            <a:r>
-              <a:rPr lang="en-US" sz="1200" dirty="0" err="1">
-                <a:hlinkClick r:id="rId2"/>
-              </a:rPr>
-              <a:t>Bahdanau</a:t>
-            </a:r>
-            <a:r>
-              <a:rPr lang="en-US" sz="1200" dirty="0">
-                <a:hlinkClick r:id="rId2"/>
-              </a:rPr>
-              <a:t> Attention Mechanism</a:t>
-            </a:r>
-            <a:endParaRPr lang="en-US" sz="1200" dirty="0"/>
-          </a:p>
-          <a:p>
-            <a:pPr lvl="1"/>
-            <a:r>
-              <a:rPr lang="en-US" sz="1200" dirty="0">
-                <a:hlinkClick r:id="rId3"/>
-              </a:rPr>
-              <a:t>Visualizing A Neural Machine Translation Model (Mechanics of Seq2seq Models with Attention)</a:t>
-            </a:r>
-            <a:endParaRPr lang="en-US" sz="1200" dirty="0"/>
-          </a:p>
-          <a:p>
-            <a:pPr lvl="1"/>
-            <a:r>
-              <a:rPr lang="en-US" sz="1200" dirty="0">
-                <a:hlinkClick r:id="rId4"/>
-              </a:rPr>
-              <a:t>The Illustrated Transformer </a:t>
-            </a:r>
-            <a:endParaRPr lang="en-US" sz="1200" dirty="0"/>
-          </a:p>
-          <a:p>
-            <a:pPr lvl="1"/>
-            <a:r>
-              <a:rPr lang="en-US" sz="1200" dirty="0">
-                <a:hlinkClick r:id="rId5"/>
-              </a:rPr>
-              <a:t>Illustrated attention</a:t>
-            </a:r>
-            <a:endParaRPr lang="en-US" sz="1200" dirty="0"/>
-          </a:p>
-          <a:p>
-            <a:pPr lvl="1"/>
-            <a:r>
-              <a:rPr lang="en-US" sz="1200" dirty="0">
-                <a:hlinkClick r:id="rId6"/>
-              </a:rPr>
-              <a:t>The annotated transformer</a:t>
-            </a:r>
-            <a:endParaRPr lang="en-US" sz="1200" dirty="0"/>
-          </a:p>
-          <a:p>
-            <a:r>
-              <a:rPr lang="en-US" dirty="0"/>
-              <a:t>Papers </a:t>
-            </a:r>
-          </a:p>
-          <a:p>
-            <a:pPr lvl="1"/>
-            <a:r>
-              <a:rPr lang="en-US" sz="1100" dirty="0">
-                <a:hlinkClick r:id="rId7"/>
-              </a:rPr>
-              <a:t>Learning Phrase Representations using RNN Encoder-Decoder for Statistical Machine Translation, 2014</a:t>
-            </a:r>
-            <a:endParaRPr lang="en-US" sz="1100" dirty="0"/>
-          </a:p>
-          <a:p>
-            <a:pPr lvl="1"/>
-            <a:r>
-              <a:rPr lang="en-US" sz="1200" dirty="0">
-                <a:hlinkClick r:id="rId8"/>
-              </a:rPr>
-              <a:t>Sequence to Sequence Learning with Neural Networks, 2014</a:t>
-            </a:r>
-            <a:endParaRPr lang="en-US" sz="1200" dirty="0"/>
-          </a:p>
-          <a:p>
-            <a:pPr lvl="1"/>
-            <a:r>
-              <a:rPr lang="en-US" sz="1200" dirty="0">
-                <a:hlinkClick r:id="rId9"/>
-              </a:rPr>
-              <a:t>Neural Machine Translation by jointly learning to align and translate, 2014</a:t>
-            </a:r>
-            <a:endParaRPr lang="en-US" sz="1200" dirty="0"/>
-          </a:p>
-          <a:p>
-            <a:pPr lvl="1"/>
-            <a:r>
-              <a:rPr lang="en-US" sz="1200" dirty="0">
-                <a:hlinkClick r:id="rId10"/>
-              </a:rPr>
-              <a:t>Attention is All you need, 2017</a:t>
-            </a:r>
-            <a:endParaRPr lang="en-US" sz="1200" dirty="0"/>
-          </a:p>
-          <a:p>
-            <a:pPr lvl="1"/>
-            <a:endParaRPr lang="en-US" sz="1200" dirty="0"/>
-          </a:p>
-          <a:p>
-            <a:r>
-              <a:rPr lang="en-US" dirty="0"/>
-              <a:t>Books</a:t>
-            </a:r>
-            <a:endParaRPr lang="en-US" sz="1600" dirty="0"/>
-          </a:p>
-          <a:p>
-            <a:pPr lvl="1"/>
-            <a:r>
-              <a:rPr lang="en-US" sz="1200" dirty="0">
-                <a:hlinkClick r:id="rId11"/>
-              </a:rPr>
-              <a:t>Uday Kamath et al, Transformers for Machine Learning: a deep dive</a:t>
-            </a:r>
-            <a:endParaRPr lang="en-US" sz="1200" dirty="0"/>
-          </a:p>
-          <a:p>
-            <a:pPr lvl="1"/>
-            <a:r>
-              <a:rPr lang="en-US" sz="1200" dirty="0" err="1"/>
-              <a:t>Charu</a:t>
-            </a:r>
-            <a:r>
-              <a:rPr lang="en-US" sz="1200" dirty="0"/>
-              <a:t> C. Aggarwal, </a:t>
-            </a:r>
-            <a:r>
-              <a:rPr lang="en-US" sz="1200" dirty="0">
-                <a:hlinkClick r:id="rId12"/>
-              </a:rPr>
-              <a:t>Neural Networks and Deep Learning: A textbook</a:t>
-            </a:r>
-            <a:r>
-              <a:rPr lang="en-US" sz="1200" dirty="0"/>
-              <a:t>, 2</a:t>
-            </a:r>
-            <a:r>
-              <a:rPr lang="en-US" sz="1200" baseline="30000" dirty="0"/>
-              <a:t>nd</a:t>
-            </a:r>
-            <a:r>
-              <a:rPr lang="en-US" sz="1200" dirty="0"/>
-              <a:t> edition (to be published August 1</a:t>
-            </a:r>
-            <a:r>
-              <a:rPr lang="en-US" sz="1200" baseline="30000" dirty="0"/>
-              <a:t>st</a:t>
-            </a:r>
-            <a:r>
-              <a:rPr lang="en-US" sz="1200" dirty="0"/>
-              <a:t> 2023)</a:t>
-            </a:r>
-          </a:p>
-          <a:p>
-            <a:r>
-              <a:rPr lang="en-US" dirty="0"/>
-              <a:t>Illustrative code</a:t>
-            </a:r>
-          </a:p>
-          <a:p>
-            <a:pPr lvl="1"/>
-            <a:r>
-              <a:rPr lang="en-US" sz="1800" dirty="0">
-                <a:hlinkClick r:id="rId13"/>
-              </a:rPr>
-              <a:t>Refactored d2l </a:t>
-            </a:r>
-            <a:endParaRPr lang="en-US" sz="1800" dirty="0"/>
-          </a:p>
-          <a:p>
-            <a:pPr lvl="1"/>
-            <a:endParaRPr lang="en-US" sz="1200" dirty="0"/>
-          </a:p>
-          <a:p>
-            <a:pPr lvl="1"/>
-            <a:endParaRPr lang="en-US" sz="1200" dirty="0"/>
+        <p:spPr/>
+        <p:txBody>
+          <a:bodyPr/>
+          <a:lstStyle/>
+          <a:p>
+            <a:endParaRPr lang="en-US"/>
           </a:p>
         </p:txBody>
       </p:sp>
@@ -5319,7 +5131,7 @@
           <p:cNvPr id="4" name="Slide Number Placeholder 3">
             <a:extLst>
               <a:ext uri="{FF2B5EF4-FFF2-40B4-BE49-F238E27FC236}">
-                <a16:creationId xmlns:a16="http://schemas.microsoft.com/office/drawing/2014/main" id="{7DA9D2FF-F3BE-1294-344E-3FF9C6A23C0B}"/>
+                <a16:creationId xmlns:a16="http://schemas.microsoft.com/office/drawing/2014/main" id="{422A5B0B-B436-6D6B-F469-0B191917F1C7}"/>
               </a:ext>
             </a:extLst>
           </p:cNvPr>
@@ -5339,14 +5151,479 @@
               <a:rPr lang="en-US" smtClean="0"/>
               <a:t>16</a:t>
             </a:fld>
-            <a:endParaRPr lang="en-US" dirty="0"/>
-          </a:p>
-        </p:txBody>
-      </p:sp>
+            <a:endParaRPr lang="en-US"/>
+          </a:p>
+        </p:txBody>
+      </p:sp>
+      <p:pic>
+        <p:nvPicPr>
+          <p:cNvPr id="5" name="Picture 4">
+            <a:extLst>
+              <a:ext uri="{FF2B5EF4-FFF2-40B4-BE49-F238E27FC236}">
+                <a16:creationId xmlns:a16="http://schemas.microsoft.com/office/drawing/2014/main" id="{49150BF2-F07B-BA6B-B75F-DF7F996CA6DF}"/>
+              </a:ext>
+            </a:extLst>
+          </p:cNvPr>
+          <p:cNvPicPr>
+            <a:picLocks noChangeAspect="1"/>
+          </p:cNvPicPr>
+          <p:nvPr/>
+        </p:nvPicPr>
+        <p:blipFill>
+          <a:blip r:embed="rId2"/>
+          <a:stretch>
+            <a:fillRect/>
+          </a:stretch>
+        </p:blipFill>
+        <p:spPr>
+          <a:xfrm>
+            <a:off x="2450086" y="926971"/>
+            <a:ext cx="6629400" cy="5384800"/>
+          </a:xfrm>
+          <a:prstGeom prst="rect">
+            <a:avLst/>
+          </a:prstGeom>
+        </p:spPr>
+      </p:pic>
     </p:spTree>
     <p:extLst>
       <p:ext uri="{BB962C8B-B14F-4D97-AF65-F5344CB8AC3E}">
-        <p14:creationId xmlns:p14="http://schemas.microsoft.com/office/powerpoint/2010/main" val="342138647"/>
+        <p14:creationId xmlns:p14="http://schemas.microsoft.com/office/powerpoint/2010/main" val="1163766576"/>
+      </p:ext>
+    </p:extLst>
+  </p:cSld>
+  <p:clrMapOvr>
+    <a:masterClrMapping/>
+  </p:clrMapOvr>
+</p:sld>
+</file>
+
+<file path=ppt/slides/slide17.xml><?xml version="1.0" encoding="utf-8"?>
+<p:sld xmlns:a="http://schemas.openxmlformats.org/drawingml/2006/main" xmlns:r="http://schemas.openxmlformats.org/officeDocument/2006/relationships" xmlns:p="http://schemas.openxmlformats.org/presentationml/2006/main">
+  <p:cSld>
+    <p:spTree>
+      <p:nvGrpSpPr>
+        <p:cNvPr id="1" name=""/>
+        <p:cNvGrpSpPr/>
+        <p:nvPr/>
+      </p:nvGrpSpPr>
+      <p:grpSpPr>
+        <a:xfrm>
+          <a:off x="0" y="0"/>
+          <a:ext cx="0" cy="0"/>
+          <a:chOff x="0" y="0"/>
+          <a:chExt cx="0" cy="0"/>
+        </a:xfrm>
+      </p:grpSpPr>
+      <p:sp>
+        <p:nvSpPr>
+          <p:cNvPr id="2" name="Title 1">
+            <a:extLst>
+              <a:ext uri="{FF2B5EF4-FFF2-40B4-BE49-F238E27FC236}">
+                <a16:creationId xmlns:a16="http://schemas.microsoft.com/office/drawing/2014/main" id="{E1F0E3A3-07E4-CCB5-EF7C-332F26EC0DD5}"/>
+              </a:ext>
+            </a:extLst>
+          </p:cNvPr>
+          <p:cNvSpPr>
+            <a:spLocks noGrp="1"/>
+          </p:cNvSpPr>
+          <p:nvPr>
+            <p:ph type="title"/>
+          </p:nvPr>
+        </p:nvSpPr>
+        <p:spPr/>
+        <p:txBody>
+          <a:bodyPr/>
+          <a:lstStyle/>
+          <a:p>
+            <a:endParaRPr lang="en-US"/>
+          </a:p>
+        </p:txBody>
+      </p:sp>
+      <p:sp>
+        <p:nvSpPr>
+          <p:cNvPr id="3" name="Content Placeholder 2">
+            <a:extLst>
+              <a:ext uri="{FF2B5EF4-FFF2-40B4-BE49-F238E27FC236}">
+                <a16:creationId xmlns:a16="http://schemas.microsoft.com/office/drawing/2014/main" id="{F12F24AD-3394-E42B-395B-B45FAE99A29E}"/>
+              </a:ext>
+            </a:extLst>
+          </p:cNvPr>
+          <p:cNvSpPr>
+            <a:spLocks noGrp="1"/>
+          </p:cNvSpPr>
+          <p:nvPr>
+            <p:ph idx="1"/>
+          </p:nvPr>
+        </p:nvSpPr>
+        <p:spPr/>
+        <p:txBody>
+          <a:bodyPr/>
+          <a:lstStyle/>
+          <a:p>
+            <a:endParaRPr lang="en-US"/>
+          </a:p>
+        </p:txBody>
+      </p:sp>
+      <p:sp>
+        <p:nvSpPr>
+          <p:cNvPr id="4" name="Slide Number Placeholder 3">
+            <a:extLst>
+              <a:ext uri="{FF2B5EF4-FFF2-40B4-BE49-F238E27FC236}">
+                <a16:creationId xmlns:a16="http://schemas.microsoft.com/office/drawing/2014/main" id="{A2474450-E6F6-F8B1-7C76-EB6D668D15A7}"/>
+              </a:ext>
+            </a:extLst>
+          </p:cNvPr>
+          <p:cNvSpPr>
+            <a:spLocks noGrp="1"/>
+          </p:cNvSpPr>
+          <p:nvPr>
+            <p:ph type="sldNum" sz="quarter" idx="12"/>
+          </p:nvPr>
+        </p:nvSpPr>
+        <p:spPr/>
+        <p:txBody>
+          <a:bodyPr/>
+          <a:lstStyle/>
+          <a:p>
+            <a:fld id="{23E44598-4972-A041-A2B9-7CC9807D63CB}" type="slidenum">
+              <a:rPr lang="en-US" smtClean="0"/>
+              <a:t>17</a:t>
+            </a:fld>
+            <a:endParaRPr lang="en-US"/>
+          </a:p>
+        </p:txBody>
+      </p:sp>
+      <p:pic>
+        <p:nvPicPr>
+          <p:cNvPr id="5" name="Picture 4">
+            <a:extLst>
+              <a:ext uri="{FF2B5EF4-FFF2-40B4-BE49-F238E27FC236}">
+                <a16:creationId xmlns:a16="http://schemas.microsoft.com/office/drawing/2014/main" id="{B1040F72-AE79-AD2F-49BE-45EC49FC2613}"/>
+              </a:ext>
+            </a:extLst>
+          </p:cNvPr>
+          <p:cNvPicPr>
+            <a:picLocks noChangeAspect="1"/>
+          </p:cNvPicPr>
+          <p:nvPr/>
+        </p:nvPicPr>
+        <p:blipFill>
+          <a:blip r:embed="rId2"/>
+          <a:stretch>
+            <a:fillRect/>
+          </a:stretch>
+        </p:blipFill>
+        <p:spPr>
+          <a:xfrm>
+            <a:off x="1690816" y="656633"/>
+            <a:ext cx="8538890" cy="5544733"/>
+          </a:xfrm>
+          <a:prstGeom prst="rect">
+            <a:avLst/>
+          </a:prstGeom>
+        </p:spPr>
+      </p:pic>
+    </p:spTree>
+    <p:extLst>
+      <p:ext uri="{BB962C8B-B14F-4D97-AF65-F5344CB8AC3E}">
+        <p14:creationId xmlns:p14="http://schemas.microsoft.com/office/powerpoint/2010/main" val="2328968668"/>
+      </p:ext>
+    </p:extLst>
+  </p:cSld>
+  <p:clrMapOvr>
+    <a:masterClrMapping/>
+  </p:clrMapOvr>
+</p:sld>
+</file>
+
+<file path=ppt/slides/slide18.xml><?xml version="1.0" encoding="utf-8"?>
+<p:sld xmlns:a="http://schemas.openxmlformats.org/drawingml/2006/main" xmlns:r="http://schemas.openxmlformats.org/officeDocument/2006/relationships" xmlns:p="http://schemas.openxmlformats.org/presentationml/2006/main">
+  <p:cSld>
+    <p:spTree>
+      <p:nvGrpSpPr>
+        <p:cNvPr id="1" name=""/>
+        <p:cNvGrpSpPr/>
+        <p:nvPr/>
+      </p:nvGrpSpPr>
+      <p:grpSpPr>
+        <a:xfrm>
+          <a:off x="0" y="0"/>
+          <a:ext cx="0" cy="0"/>
+          <a:chOff x="0" y="0"/>
+          <a:chExt cx="0" cy="0"/>
+        </a:xfrm>
+      </p:grpSpPr>
+      <p:sp>
+        <p:nvSpPr>
+          <p:cNvPr id="2" name="Title 1">
+            <a:extLst>
+              <a:ext uri="{FF2B5EF4-FFF2-40B4-BE49-F238E27FC236}">
+                <a16:creationId xmlns:a16="http://schemas.microsoft.com/office/drawing/2014/main" id="{A9598E90-F14B-943B-F5EE-DE46EB3CE740}"/>
+              </a:ext>
+            </a:extLst>
+          </p:cNvPr>
+          <p:cNvSpPr>
+            <a:spLocks noGrp="1"/>
+          </p:cNvSpPr>
+          <p:nvPr>
+            <p:ph type="title"/>
+          </p:nvPr>
+        </p:nvSpPr>
+        <p:spPr/>
+        <p:txBody>
+          <a:bodyPr/>
+          <a:lstStyle/>
+          <a:p>
+            <a:r>
+              <a:rPr lang="en-US" dirty="0"/>
+              <a:t>LLM classification</a:t>
+            </a:r>
+          </a:p>
+        </p:txBody>
+      </p:sp>
+      <p:sp>
+        <p:nvSpPr>
+          <p:cNvPr id="3" name="Content Placeholder 2">
+            <a:extLst>
+              <a:ext uri="{FF2B5EF4-FFF2-40B4-BE49-F238E27FC236}">
+                <a16:creationId xmlns:a16="http://schemas.microsoft.com/office/drawing/2014/main" id="{CF6E057A-66AA-4BF5-77BC-7459B04FC5A9}"/>
+              </a:ext>
+            </a:extLst>
+          </p:cNvPr>
+          <p:cNvSpPr>
+            <a:spLocks noGrp="1"/>
+          </p:cNvSpPr>
+          <p:nvPr>
+            <p:ph idx="1"/>
+          </p:nvPr>
+        </p:nvSpPr>
+        <p:spPr/>
+        <p:txBody>
+          <a:bodyPr/>
+          <a:lstStyle/>
+          <a:p>
+            <a:r>
+              <a:rPr lang="en-US" dirty="0"/>
+              <a:t>Encoder only </a:t>
+            </a:r>
+          </a:p>
+          <a:p>
+            <a:pPr lvl="1"/>
+            <a:r>
+              <a:rPr lang="en-US" dirty="0"/>
+              <a:t>Bert </a:t>
+            </a:r>
+          </a:p>
+          <a:p>
+            <a:r>
+              <a:rPr lang="en-US" dirty="0"/>
+              <a:t>Encoder-Decoder </a:t>
+            </a:r>
+          </a:p>
+          <a:p>
+            <a:pPr lvl="1"/>
+            <a:r>
+              <a:rPr lang="en-US" dirty="0"/>
+              <a:t>BARD	, T-5</a:t>
+            </a:r>
+          </a:p>
+          <a:p>
+            <a:endParaRPr lang="en-US" dirty="0"/>
+          </a:p>
+          <a:p>
+            <a:r>
+              <a:rPr lang="en-US" dirty="0"/>
+              <a:t>Decoder only</a:t>
+            </a:r>
+          </a:p>
+          <a:p>
+            <a:pPr lvl="1"/>
+            <a:r>
+              <a:rPr lang="en-US" dirty="0"/>
+              <a:t>GPT-2/3/4</a:t>
+            </a:r>
+          </a:p>
+        </p:txBody>
+      </p:sp>
+      <p:sp>
+        <p:nvSpPr>
+          <p:cNvPr id="4" name="Slide Number Placeholder 3">
+            <a:extLst>
+              <a:ext uri="{FF2B5EF4-FFF2-40B4-BE49-F238E27FC236}">
+                <a16:creationId xmlns:a16="http://schemas.microsoft.com/office/drawing/2014/main" id="{6928EC95-E8DA-400E-1B7B-D62D49947319}"/>
+              </a:ext>
+            </a:extLst>
+          </p:cNvPr>
+          <p:cNvSpPr>
+            <a:spLocks noGrp="1"/>
+          </p:cNvSpPr>
+          <p:nvPr>
+            <p:ph type="sldNum" sz="quarter" idx="12"/>
+          </p:nvPr>
+        </p:nvSpPr>
+        <p:spPr/>
+        <p:txBody>
+          <a:bodyPr/>
+          <a:lstStyle/>
+          <a:p>
+            <a:fld id="{23E44598-4972-A041-A2B9-7CC9807D63CB}" type="slidenum">
+              <a:rPr lang="en-US" smtClean="0"/>
+              <a:t>18</a:t>
+            </a:fld>
+            <a:endParaRPr lang="en-US"/>
+          </a:p>
+        </p:txBody>
+      </p:sp>
+    </p:spTree>
+    <p:extLst>
+      <p:ext uri="{BB962C8B-B14F-4D97-AF65-F5344CB8AC3E}">
+        <p14:creationId xmlns:p14="http://schemas.microsoft.com/office/powerpoint/2010/main" val="3013696922"/>
+      </p:ext>
+    </p:extLst>
+  </p:cSld>
+  <p:clrMapOvr>
+    <a:masterClrMapping/>
+  </p:clrMapOvr>
+</p:sld>
+</file>
+
+<file path=ppt/slides/slide19.xml><?xml version="1.0" encoding="utf-8"?>
+<p:sld xmlns:a="http://schemas.openxmlformats.org/drawingml/2006/main" xmlns:r="http://schemas.openxmlformats.org/officeDocument/2006/relationships" xmlns:p="http://schemas.openxmlformats.org/presentationml/2006/main">
+  <p:cSld>
+    <p:spTree>
+      <p:nvGrpSpPr>
+        <p:cNvPr id="1" name=""/>
+        <p:cNvGrpSpPr/>
+        <p:nvPr/>
+      </p:nvGrpSpPr>
+      <p:grpSpPr>
+        <a:xfrm>
+          <a:off x="0" y="0"/>
+          <a:ext cx="0" cy="0"/>
+          <a:chOff x="0" y="0"/>
+          <a:chExt cx="0" cy="0"/>
+        </a:xfrm>
+      </p:grpSpPr>
+      <p:sp>
+        <p:nvSpPr>
+          <p:cNvPr id="2" name="Title 1">
+            <a:extLst>
+              <a:ext uri="{FF2B5EF4-FFF2-40B4-BE49-F238E27FC236}">
+                <a16:creationId xmlns:a16="http://schemas.microsoft.com/office/drawing/2014/main" id="{D3E4C35F-FF1A-A502-21C0-7097BB93B0BF}"/>
+              </a:ext>
+            </a:extLst>
+          </p:cNvPr>
+          <p:cNvSpPr>
+            <a:spLocks noGrp="1"/>
+          </p:cNvSpPr>
+          <p:nvPr>
+            <p:ph type="title"/>
+          </p:nvPr>
+        </p:nvSpPr>
+        <p:spPr/>
+        <p:txBody>
+          <a:bodyPr/>
+          <a:lstStyle/>
+          <a:p>
+            <a:r>
+              <a:rPr lang="en-US" dirty="0"/>
+              <a:t>Prompt Engineering</a:t>
+            </a:r>
+          </a:p>
+        </p:txBody>
+      </p:sp>
+      <p:sp>
+        <p:nvSpPr>
+          <p:cNvPr id="3" name="Content Placeholder 2">
+            <a:extLst>
+              <a:ext uri="{FF2B5EF4-FFF2-40B4-BE49-F238E27FC236}">
+                <a16:creationId xmlns:a16="http://schemas.microsoft.com/office/drawing/2014/main" id="{94C7B7C7-FD31-D9EC-C3E9-E200CD3D8AB7}"/>
+              </a:ext>
+            </a:extLst>
+          </p:cNvPr>
+          <p:cNvSpPr>
+            <a:spLocks noGrp="1"/>
+          </p:cNvSpPr>
+          <p:nvPr>
+            <p:ph idx="1"/>
+          </p:nvPr>
+        </p:nvSpPr>
+        <p:spPr/>
+        <p:txBody>
+          <a:bodyPr/>
+          <a:lstStyle/>
+          <a:p>
+            <a:endParaRPr lang="en-US" dirty="0"/>
+          </a:p>
+          <a:p>
+            <a:r>
+              <a:rPr lang="en-US" dirty="0"/>
+              <a:t>Zero-shot </a:t>
+            </a:r>
+          </a:p>
+          <a:p>
+            <a:endParaRPr lang="en-US" dirty="0"/>
+          </a:p>
+          <a:p>
+            <a:r>
+              <a:rPr lang="en-US" dirty="0"/>
+              <a:t>One-shot </a:t>
+            </a:r>
+          </a:p>
+          <a:p>
+            <a:endParaRPr lang="en-US" dirty="0"/>
+          </a:p>
+          <a:p>
+            <a:r>
+              <a:rPr lang="en-US" dirty="0"/>
+              <a:t>Few-shot </a:t>
+            </a:r>
+          </a:p>
+          <a:p>
+            <a:endParaRPr lang="en-US" dirty="0"/>
+          </a:p>
+          <a:p>
+            <a:r>
+              <a:rPr lang="en-US" dirty="0"/>
+              <a:t>PS: prompt engineering does not alter the model’s parameters  </a:t>
+            </a:r>
+          </a:p>
+        </p:txBody>
+      </p:sp>
+      <p:sp>
+        <p:nvSpPr>
+          <p:cNvPr id="4" name="Slide Number Placeholder 3">
+            <a:extLst>
+              <a:ext uri="{FF2B5EF4-FFF2-40B4-BE49-F238E27FC236}">
+                <a16:creationId xmlns:a16="http://schemas.microsoft.com/office/drawing/2014/main" id="{D95CB8FE-D31C-B4C0-567D-7455DF216025}"/>
+              </a:ext>
+            </a:extLst>
+          </p:cNvPr>
+          <p:cNvSpPr>
+            <a:spLocks noGrp="1"/>
+          </p:cNvSpPr>
+          <p:nvPr>
+            <p:ph type="sldNum" sz="quarter" idx="12"/>
+          </p:nvPr>
+        </p:nvSpPr>
+        <p:spPr/>
+        <p:txBody>
+          <a:bodyPr/>
+          <a:lstStyle/>
+          <a:p>
+            <a:fld id="{23E44598-4972-A041-A2B9-7CC9807D63CB}" type="slidenum">
+              <a:rPr lang="en-US" smtClean="0"/>
+              <a:t>19</a:t>
+            </a:fld>
+            <a:endParaRPr lang="en-US"/>
+          </a:p>
+        </p:txBody>
+      </p:sp>
+    </p:spTree>
+    <p:extLst>
+      <p:ext uri="{BB962C8B-B14F-4D97-AF65-F5344CB8AC3E}">
+        <p14:creationId xmlns:p14="http://schemas.microsoft.com/office/powerpoint/2010/main" val="3476461751"/>
       </p:ext>
     </p:extLst>
   </p:cSld>
@@ -5534,6 +5811,593 @@
     <p:extLst>
       <p:ext uri="{BB962C8B-B14F-4D97-AF65-F5344CB8AC3E}">
         <p14:creationId xmlns:p14="http://schemas.microsoft.com/office/powerpoint/2010/main" val="1113708017"/>
+      </p:ext>
+    </p:extLst>
+  </p:cSld>
+  <p:clrMapOvr>
+    <a:masterClrMapping/>
+  </p:clrMapOvr>
+</p:sld>
+</file>
+
+<file path=ppt/slides/slide20.xml><?xml version="1.0" encoding="utf-8"?>
+<p:sld xmlns:a="http://schemas.openxmlformats.org/drawingml/2006/main" xmlns:r="http://schemas.openxmlformats.org/officeDocument/2006/relationships" xmlns:p="http://schemas.openxmlformats.org/presentationml/2006/main">
+  <p:cSld>
+    <p:spTree>
+      <p:nvGrpSpPr>
+        <p:cNvPr id="1" name=""/>
+        <p:cNvGrpSpPr/>
+        <p:nvPr/>
+      </p:nvGrpSpPr>
+      <p:grpSpPr>
+        <a:xfrm>
+          <a:off x="0" y="0"/>
+          <a:ext cx="0" cy="0"/>
+          <a:chOff x="0" y="0"/>
+          <a:chExt cx="0" cy="0"/>
+        </a:xfrm>
+      </p:grpSpPr>
+      <p:sp>
+        <p:nvSpPr>
+          <p:cNvPr id="2" name="Title 1">
+            <a:extLst>
+              <a:ext uri="{FF2B5EF4-FFF2-40B4-BE49-F238E27FC236}">
+                <a16:creationId xmlns:a16="http://schemas.microsoft.com/office/drawing/2014/main" id="{532C3272-675D-BCCA-8194-DD9280CA321E}"/>
+              </a:ext>
+            </a:extLst>
+          </p:cNvPr>
+          <p:cNvSpPr>
+            <a:spLocks noGrp="1"/>
+          </p:cNvSpPr>
+          <p:nvPr>
+            <p:ph type="title"/>
+          </p:nvPr>
+        </p:nvSpPr>
+        <p:spPr/>
+        <p:txBody>
+          <a:bodyPr/>
+          <a:lstStyle/>
+          <a:p>
+            <a:r>
+              <a:rPr lang="en-US" dirty="0"/>
+              <a:t>Fine-tuning</a:t>
+            </a:r>
+          </a:p>
+        </p:txBody>
+      </p:sp>
+      <p:sp>
+        <p:nvSpPr>
+          <p:cNvPr id="3" name="Content Placeholder 2">
+            <a:extLst>
+              <a:ext uri="{FF2B5EF4-FFF2-40B4-BE49-F238E27FC236}">
+                <a16:creationId xmlns:a16="http://schemas.microsoft.com/office/drawing/2014/main" id="{ADAAB5F3-356C-5750-F49F-11A17C70BFA8}"/>
+              </a:ext>
+            </a:extLst>
+          </p:cNvPr>
+          <p:cNvSpPr>
+            <a:spLocks noGrp="1"/>
+          </p:cNvSpPr>
+          <p:nvPr>
+            <p:ph idx="1"/>
+          </p:nvPr>
+        </p:nvSpPr>
+        <p:spPr/>
+        <p:txBody>
+          <a:bodyPr/>
+          <a:lstStyle/>
+          <a:p>
+            <a:r>
+              <a:rPr lang="en-US" dirty="0"/>
+              <a:t>Updating the model’s parameters on task-specific training data </a:t>
+            </a:r>
+          </a:p>
+        </p:txBody>
+      </p:sp>
+      <p:sp>
+        <p:nvSpPr>
+          <p:cNvPr id="4" name="Slide Number Placeholder 3">
+            <a:extLst>
+              <a:ext uri="{FF2B5EF4-FFF2-40B4-BE49-F238E27FC236}">
+                <a16:creationId xmlns:a16="http://schemas.microsoft.com/office/drawing/2014/main" id="{3FB4D2E4-9F47-A042-B768-2F3C74FB26AB}"/>
+              </a:ext>
+            </a:extLst>
+          </p:cNvPr>
+          <p:cNvSpPr>
+            <a:spLocks noGrp="1"/>
+          </p:cNvSpPr>
+          <p:nvPr>
+            <p:ph type="sldNum" sz="quarter" idx="12"/>
+          </p:nvPr>
+        </p:nvSpPr>
+        <p:spPr/>
+        <p:txBody>
+          <a:bodyPr/>
+          <a:lstStyle/>
+          <a:p>
+            <a:fld id="{23E44598-4972-A041-A2B9-7CC9807D63CB}" type="slidenum">
+              <a:rPr lang="en-US" smtClean="0"/>
+              <a:t>20</a:t>
+            </a:fld>
+            <a:endParaRPr lang="en-US"/>
+          </a:p>
+        </p:txBody>
+      </p:sp>
+    </p:spTree>
+    <p:extLst>
+      <p:ext uri="{BB962C8B-B14F-4D97-AF65-F5344CB8AC3E}">
+        <p14:creationId xmlns:p14="http://schemas.microsoft.com/office/powerpoint/2010/main" val="1371486381"/>
+      </p:ext>
+    </p:extLst>
+  </p:cSld>
+  <p:clrMapOvr>
+    <a:masterClrMapping/>
+  </p:clrMapOvr>
+</p:sld>
+</file>
+
+<file path=ppt/slides/slide21.xml><?xml version="1.0" encoding="utf-8"?>
+<p:sld xmlns:a="http://schemas.openxmlformats.org/drawingml/2006/main" xmlns:r="http://schemas.openxmlformats.org/officeDocument/2006/relationships" xmlns:p="http://schemas.openxmlformats.org/presentationml/2006/main">
+  <p:cSld>
+    <p:spTree>
+      <p:nvGrpSpPr>
+        <p:cNvPr id="1" name=""/>
+        <p:cNvGrpSpPr/>
+        <p:nvPr/>
+      </p:nvGrpSpPr>
+      <p:grpSpPr>
+        <a:xfrm>
+          <a:off x="0" y="0"/>
+          <a:ext cx="0" cy="0"/>
+          <a:chOff x="0" y="0"/>
+          <a:chExt cx="0" cy="0"/>
+        </a:xfrm>
+      </p:grpSpPr>
+      <p:sp>
+        <p:nvSpPr>
+          <p:cNvPr id="2" name="Title 1">
+            <a:extLst>
+              <a:ext uri="{FF2B5EF4-FFF2-40B4-BE49-F238E27FC236}">
+                <a16:creationId xmlns:a16="http://schemas.microsoft.com/office/drawing/2014/main" id="{C25F1EBC-003C-ECD9-4E7F-BF951CC85E61}"/>
+              </a:ext>
+            </a:extLst>
+          </p:cNvPr>
+          <p:cNvSpPr>
+            <a:spLocks noGrp="1"/>
+          </p:cNvSpPr>
+          <p:nvPr>
+            <p:ph type="title"/>
+          </p:nvPr>
+        </p:nvSpPr>
+        <p:spPr/>
+        <p:txBody>
+          <a:bodyPr/>
+          <a:lstStyle/>
+          <a:p>
+            <a:endParaRPr lang="en-US"/>
+          </a:p>
+        </p:txBody>
+      </p:sp>
+      <p:sp>
+        <p:nvSpPr>
+          <p:cNvPr id="3" name="Content Placeholder 2">
+            <a:extLst>
+              <a:ext uri="{FF2B5EF4-FFF2-40B4-BE49-F238E27FC236}">
+                <a16:creationId xmlns:a16="http://schemas.microsoft.com/office/drawing/2014/main" id="{972D2775-3F6A-0627-7EA1-4D5E58996FC2}"/>
+              </a:ext>
+            </a:extLst>
+          </p:cNvPr>
+          <p:cNvSpPr>
+            <a:spLocks noGrp="1"/>
+          </p:cNvSpPr>
+          <p:nvPr>
+            <p:ph idx="1"/>
+          </p:nvPr>
+        </p:nvSpPr>
+        <p:spPr>
+          <a:xfrm>
+            <a:off x="1643270" y="6143418"/>
+            <a:ext cx="1855304" cy="698914"/>
+          </a:xfrm>
+        </p:spPr>
+        <p:txBody>
+          <a:bodyPr/>
+          <a:lstStyle/>
+          <a:p>
+            <a:pPr marL="0" indent="0">
+              <a:buNone/>
+            </a:pPr>
+            <a:r>
+              <a:rPr lang="en-US" dirty="0">
+                <a:hlinkClick r:id="rId2"/>
+              </a:rPr>
+              <a:t>source</a:t>
+            </a:r>
+            <a:endParaRPr lang="en-US" dirty="0"/>
+          </a:p>
+        </p:txBody>
+      </p:sp>
+      <p:sp>
+        <p:nvSpPr>
+          <p:cNvPr id="4" name="Slide Number Placeholder 3">
+            <a:extLst>
+              <a:ext uri="{FF2B5EF4-FFF2-40B4-BE49-F238E27FC236}">
+                <a16:creationId xmlns:a16="http://schemas.microsoft.com/office/drawing/2014/main" id="{1C1861FE-17EF-232C-D90A-B4877AF4B656}"/>
+              </a:ext>
+            </a:extLst>
+          </p:cNvPr>
+          <p:cNvSpPr>
+            <a:spLocks noGrp="1"/>
+          </p:cNvSpPr>
+          <p:nvPr>
+            <p:ph type="sldNum" sz="quarter" idx="12"/>
+          </p:nvPr>
+        </p:nvSpPr>
+        <p:spPr/>
+        <p:txBody>
+          <a:bodyPr/>
+          <a:lstStyle/>
+          <a:p>
+            <a:fld id="{23E44598-4972-A041-A2B9-7CC9807D63CB}" type="slidenum">
+              <a:rPr lang="en-US" smtClean="0"/>
+              <a:t>21</a:t>
+            </a:fld>
+            <a:endParaRPr lang="en-US"/>
+          </a:p>
+        </p:txBody>
+      </p:sp>
+      <p:pic>
+        <p:nvPicPr>
+          <p:cNvPr id="5" name="Picture 4">
+            <a:extLst>
+              <a:ext uri="{FF2B5EF4-FFF2-40B4-BE49-F238E27FC236}">
+                <a16:creationId xmlns:a16="http://schemas.microsoft.com/office/drawing/2014/main" id="{344E99D7-A486-0AA9-05F1-6538248E316B}"/>
+              </a:ext>
+            </a:extLst>
+          </p:cNvPr>
+          <p:cNvPicPr>
+            <a:picLocks noChangeAspect="1"/>
+          </p:cNvPicPr>
+          <p:nvPr/>
+        </p:nvPicPr>
+        <p:blipFill>
+          <a:blip r:embed="rId3"/>
+          <a:stretch>
+            <a:fillRect/>
+          </a:stretch>
+        </p:blipFill>
+        <p:spPr>
+          <a:xfrm>
+            <a:off x="3581401" y="0"/>
+            <a:ext cx="7321708" cy="6858000"/>
+          </a:xfrm>
+          <a:prstGeom prst="rect">
+            <a:avLst/>
+          </a:prstGeom>
+        </p:spPr>
+      </p:pic>
+    </p:spTree>
+    <p:extLst>
+      <p:ext uri="{BB962C8B-B14F-4D97-AF65-F5344CB8AC3E}">
+        <p14:creationId xmlns:p14="http://schemas.microsoft.com/office/powerpoint/2010/main" val="1855426703"/>
+      </p:ext>
+    </p:extLst>
+  </p:cSld>
+  <p:clrMapOvr>
+    <a:masterClrMapping/>
+  </p:clrMapOvr>
+</p:sld>
+</file>
+
+<file path=ppt/slides/slide22.xml><?xml version="1.0" encoding="utf-8"?>
+<p:sld xmlns:a="http://schemas.openxmlformats.org/drawingml/2006/main" xmlns:r="http://schemas.openxmlformats.org/officeDocument/2006/relationships" xmlns:p="http://schemas.openxmlformats.org/presentationml/2006/main">
+  <p:cSld>
+    <p:spTree>
+      <p:nvGrpSpPr>
+        <p:cNvPr id="1" name=""/>
+        <p:cNvGrpSpPr/>
+        <p:nvPr/>
+      </p:nvGrpSpPr>
+      <p:grpSpPr>
+        <a:xfrm>
+          <a:off x="0" y="0"/>
+          <a:ext cx="0" cy="0"/>
+          <a:chOff x="0" y="0"/>
+          <a:chExt cx="0" cy="0"/>
+        </a:xfrm>
+      </p:grpSpPr>
+      <p:sp>
+        <p:nvSpPr>
+          <p:cNvPr id="2" name="Title 1">
+            <a:extLst>
+              <a:ext uri="{FF2B5EF4-FFF2-40B4-BE49-F238E27FC236}">
+                <a16:creationId xmlns:a16="http://schemas.microsoft.com/office/drawing/2014/main" id="{CCE09888-7415-94D9-50B0-0B54B777E756}"/>
+              </a:ext>
+            </a:extLst>
+          </p:cNvPr>
+          <p:cNvSpPr>
+            <a:spLocks noGrp="1"/>
+          </p:cNvSpPr>
+          <p:nvPr>
+            <p:ph type="title"/>
+          </p:nvPr>
+        </p:nvSpPr>
+        <p:spPr>
+          <a:xfrm>
+            <a:off x="271669" y="136525"/>
+            <a:ext cx="10515600" cy="544512"/>
+          </a:xfrm>
+        </p:spPr>
+        <p:txBody>
+          <a:bodyPr>
+            <a:normAutofit fontScale="90000"/>
+          </a:bodyPr>
+          <a:lstStyle/>
+          <a:p>
+            <a:r>
+              <a:rPr lang="en-US" dirty="0"/>
+              <a:t>References </a:t>
+            </a:r>
+          </a:p>
+        </p:txBody>
+      </p:sp>
+      <p:sp>
+        <p:nvSpPr>
+          <p:cNvPr id="3" name="Content Placeholder 2">
+            <a:extLst>
+              <a:ext uri="{FF2B5EF4-FFF2-40B4-BE49-F238E27FC236}">
+                <a16:creationId xmlns:a16="http://schemas.microsoft.com/office/drawing/2014/main" id="{9B83B793-1BE9-C9A9-21AC-9BEBCB818BBE}"/>
+              </a:ext>
+            </a:extLst>
+          </p:cNvPr>
+          <p:cNvSpPr>
+            <a:spLocks noGrp="1"/>
+          </p:cNvSpPr>
+          <p:nvPr>
+            <p:ph idx="1"/>
+          </p:nvPr>
+        </p:nvSpPr>
+        <p:spPr>
+          <a:xfrm>
+            <a:off x="838200" y="805070"/>
+            <a:ext cx="10515600" cy="5371893"/>
+          </a:xfrm>
+        </p:spPr>
+        <p:txBody>
+          <a:bodyPr>
+            <a:normAutofit/>
+          </a:bodyPr>
+          <a:lstStyle/>
+          <a:p>
+            <a:r>
+              <a:rPr lang="en-US" dirty="0"/>
+              <a:t>Blog posts </a:t>
+            </a:r>
+          </a:p>
+          <a:p>
+            <a:pPr lvl="1"/>
+            <a:r>
+              <a:rPr lang="en-US" sz="1200" dirty="0">
+                <a:hlinkClick r:id="rId2"/>
+              </a:rPr>
+              <a:t>The </a:t>
+            </a:r>
+            <a:r>
+              <a:rPr lang="en-US" sz="1200" dirty="0" err="1">
+                <a:hlinkClick r:id="rId2"/>
+              </a:rPr>
+              <a:t>Bahdanau</a:t>
+            </a:r>
+            <a:r>
+              <a:rPr lang="en-US" sz="1200" dirty="0">
+                <a:hlinkClick r:id="rId2"/>
+              </a:rPr>
+              <a:t> Attention Mechanism</a:t>
+            </a:r>
+            <a:endParaRPr lang="en-US" sz="1200" dirty="0"/>
+          </a:p>
+          <a:p>
+            <a:pPr lvl="1"/>
+            <a:r>
+              <a:rPr lang="en-US" sz="1200" dirty="0">
+                <a:hlinkClick r:id="rId3"/>
+              </a:rPr>
+              <a:t>Visualizing A Neural Machine Translation Model (Mechanics of Seq2seq Models with Attention)</a:t>
+            </a:r>
+            <a:endParaRPr lang="en-US" sz="1200" dirty="0"/>
+          </a:p>
+          <a:p>
+            <a:pPr lvl="1"/>
+            <a:r>
+              <a:rPr lang="en-US" sz="1200" dirty="0">
+                <a:hlinkClick r:id="rId4"/>
+              </a:rPr>
+              <a:t>The Illustrated Transformer </a:t>
+            </a:r>
+            <a:endParaRPr lang="en-US" sz="1200" dirty="0"/>
+          </a:p>
+          <a:p>
+            <a:pPr lvl="1"/>
+            <a:r>
+              <a:rPr lang="en-US" sz="1200" dirty="0">
+                <a:hlinkClick r:id="rId5"/>
+              </a:rPr>
+              <a:t>Illustrated attention</a:t>
+            </a:r>
+            <a:endParaRPr lang="en-US" sz="1200" dirty="0"/>
+          </a:p>
+          <a:p>
+            <a:pPr lvl="1"/>
+            <a:r>
+              <a:rPr lang="en-US" sz="1200" dirty="0">
+                <a:hlinkClick r:id="rId6"/>
+              </a:rPr>
+              <a:t>The annotated transformer</a:t>
+            </a:r>
+            <a:endParaRPr lang="en-US" sz="1200" dirty="0"/>
+          </a:p>
+          <a:p>
+            <a:r>
+              <a:rPr lang="en-US" dirty="0"/>
+              <a:t>Papers </a:t>
+            </a:r>
+          </a:p>
+          <a:p>
+            <a:pPr lvl="1"/>
+            <a:r>
+              <a:rPr lang="en-US" sz="1100" dirty="0">
+                <a:hlinkClick r:id="rId7"/>
+              </a:rPr>
+              <a:t>Learning Phrase Representations using RNN Encoder-Decoder for Statistical Machine Translation, 2014</a:t>
+            </a:r>
+            <a:endParaRPr lang="en-US" sz="1100" dirty="0"/>
+          </a:p>
+          <a:p>
+            <a:pPr lvl="1"/>
+            <a:r>
+              <a:rPr lang="en-US" sz="1200" dirty="0">
+                <a:hlinkClick r:id="rId8"/>
+              </a:rPr>
+              <a:t>Sequence to Sequence Learning with Neural Networks, 2014</a:t>
+            </a:r>
+            <a:endParaRPr lang="en-US" sz="1200" dirty="0"/>
+          </a:p>
+          <a:p>
+            <a:pPr lvl="1"/>
+            <a:r>
+              <a:rPr lang="en-US" sz="1200" dirty="0">
+                <a:hlinkClick r:id="rId9"/>
+              </a:rPr>
+              <a:t>Neural Machine Translation by jointly learning to align and translate, 2014</a:t>
+            </a:r>
+            <a:endParaRPr lang="en-US" sz="1200" dirty="0"/>
+          </a:p>
+          <a:p>
+            <a:pPr lvl="1"/>
+            <a:r>
+              <a:rPr lang="en-US" sz="1200" dirty="0">
+                <a:hlinkClick r:id="rId10"/>
+              </a:rPr>
+              <a:t>Attention is All you need, 2017</a:t>
+            </a:r>
+            <a:endParaRPr lang="en-US" sz="1200" dirty="0"/>
+          </a:p>
+          <a:p>
+            <a:pPr lvl="1"/>
+            <a:endParaRPr lang="en-US" sz="1200" dirty="0"/>
+          </a:p>
+          <a:p>
+            <a:r>
+              <a:rPr lang="en-US" dirty="0"/>
+              <a:t>Books</a:t>
+            </a:r>
+            <a:endParaRPr lang="en-US" sz="1600" dirty="0"/>
+          </a:p>
+          <a:p>
+            <a:pPr lvl="1"/>
+            <a:r>
+              <a:rPr lang="en-US" sz="1200" dirty="0">
+                <a:hlinkClick r:id="rId11"/>
+              </a:rPr>
+              <a:t>Uday Kamath et al, Transformers for Machine Learning: a deep dive</a:t>
+            </a:r>
+            <a:endParaRPr lang="en-US" sz="1200" dirty="0"/>
+          </a:p>
+          <a:p>
+            <a:pPr lvl="1"/>
+            <a:r>
+              <a:rPr lang="en-US" sz="1200" dirty="0" err="1"/>
+              <a:t>Charu</a:t>
+            </a:r>
+            <a:r>
+              <a:rPr lang="en-US" sz="1200" dirty="0"/>
+              <a:t> C. Aggarwal, </a:t>
+            </a:r>
+            <a:r>
+              <a:rPr lang="en-US" sz="1200" dirty="0">
+                <a:hlinkClick r:id="rId12"/>
+              </a:rPr>
+              <a:t>Neural Networks and Deep Learning: A textbook</a:t>
+            </a:r>
+            <a:r>
+              <a:rPr lang="en-US" sz="1200" dirty="0"/>
+              <a:t>, 2</a:t>
+            </a:r>
+            <a:r>
+              <a:rPr lang="en-US" sz="1200" baseline="30000" dirty="0"/>
+              <a:t>nd</a:t>
+            </a:r>
+            <a:r>
+              <a:rPr lang="en-US" sz="1200" dirty="0"/>
+              <a:t> edition (to be published August 1</a:t>
+            </a:r>
+            <a:r>
+              <a:rPr lang="en-US" sz="1200" baseline="30000" dirty="0"/>
+              <a:t>st</a:t>
+            </a:r>
+            <a:r>
+              <a:rPr lang="en-US" sz="1200" dirty="0"/>
+              <a:t> 2023)</a:t>
+            </a:r>
+          </a:p>
+          <a:p>
+            <a:r>
+              <a:rPr lang="en-US" dirty="0"/>
+              <a:t>Illustrative code</a:t>
+            </a:r>
+          </a:p>
+          <a:p>
+            <a:pPr lvl="1"/>
+            <a:r>
+              <a:rPr lang="en-US" sz="1800" dirty="0">
+                <a:hlinkClick r:id="rId13"/>
+              </a:rPr>
+              <a:t>Refactored d2l </a:t>
+            </a:r>
+            <a:endParaRPr lang="en-US" sz="1800" dirty="0"/>
+          </a:p>
+          <a:p>
+            <a:pPr lvl="1"/>
+            <a:endParaRPr lang="en-US" sz="1200" dirty="0"/>
+          </a:p>
+          <a:p>
+            <a:pPr lvl="1"/>
+            <a:endParaRPr lang="en-US" sz="1200" dirty="0"/>
+          </a:p>
+        </p:txBody>
+      </p:sp>
+      <p:sp>
+        <p:nvSpPr>
+          <p:cNvPr id="4" name="Slide Number Placeholder 3">
+            <a:extLst>
+              <a:ext uri="{FF2B5EF4-FFF2-40B4-BE49-F238E27FC236}">
+                <a16:creationId xmlns:a16="http://schemas.microsoft.com/office/drawing/2014/main" id="{7DA9D2FF-F3BE-1294-344E-3FF9C6A23C0B}"/>
+              </a:ext>
+            </a:extLst>
+          </p:cNvPr>
+          <p:cNvSpPr>
+            <a:spLocks noGrp="1"/>
+          </p:cNvSpPr>
+          <p:nvPr>
+            <p:ph type="sldNum" sz="quarter" idx="12"/>
+          </p:nvPr>
+        </p:nvSpPr>
+        <p:spPr/>
+        <p:txBody>
+          <a:bodyPr/>
+          <a:lstStyle/>
+          <a:p>
+            <a:fld id="{23E44598-4972-A041-A2B9-7CC9807D63CB}" type="slidenum">
+              <a:rPr lang="en-US" smtClean="0"/>
+              <a:t>22</a:t>
+            </a:fld>
+            <a:endParaRPr lang="en-US" dirty="0"/>
+          </a:p>
+        </p:txBody>
+      </p:sp>
+    </p:spTree>
+    <p:extLst>
+      <p:ext uri="{BB962C8B-B14F-4D97-AF65-F5344CB8AC3E}">
+        <p14:creationId xmlns:p14="http://schemas.microsoft.com/office/powerpoint/2010/main" val="342138647"/>
       </p:ext>
     </p:extLst>
   </p:cSld>

</xml_diff>